<commit_message>
GitHub code link Added Car-3 foundation projects: encoders, distance, GPS, MPU6050 calibration, trajectories
</commit_message>
<xml_diff>
--- a/01_FoundationProjects/01_Car-3_Basic_Movements/01_Car-3_Basic_Movements.pptx
+++ b/01_FoundationProjects/01_Car-3_Basic_Movements/01_Car-3_Basic_Movements.pptx
@@ -150,7 +150,7 @@
       </p:grpSpPr>
       <p:sp>
         <p:nvSpPr>
-          <p:cNvPr id="1443850819" name="Header Placeholder 1"/>
+          <p:cNvPr id="69901326" name="Header Placeholder 1"/>
           <p:cNvSpPr>
             <a:spLocks noGrp="1"/>
           </p:cNvSpPr>
@@ -184,7 +184,7 @@
       </p:sp>
       <p:sp>
         <p:nvSpPr>
-          <p:cNvPr id="747734988" name="Date Placeholder 2"/>
+          <p:cNvPr id="679745220" name="Date Placeholder 2"/>
           <p:cNvSpPr>
             <a:spLocks noGrp="1"/>
           </p:cNvSpPr>
@@ -218,7 +218,7 @@
       </p:sp>
       <p:sp>
         <p:nvSpPr>
-          <p:cNvPr id="1810194726" name="Date Placeholder 2"/>
+          <p:cNvPr id="316567633" name="Date Placeholder 2"/>
           <p:cNvSpPr>
             <a:spLocks noGrp="1"/>
           </p:cNvSpPr>
@@ -252,7 +252,7 @@
       </p:sp>
       <p:sp>
         <p:nvSpPr>
-          <p:cNvPr id="159237799" name="Notes Placeholder 4"/>
+          <p:cNvPr id="1380121717" name="Notes Placeholder 4"/>
           <p:cNvSpPr>
             <a:spLocks noGrp="1"/>
           </p:cNvSpPr>
@@ -282,7 +282,7 @@
       </p:sp>
       <p:sp>
         <p:nvSpPr>
-          <p:cNvPr id="118619240" name="Footer Placeholder 5"/>
+          <p:cNvPr id="805186181" name="Footer Placeholder 5"/>
           <p:cNvSpPr>
             <a:spLocks noGrp="1"/>
           </p:cNvSpPr>
@@ -316,7 +316,7 @@
       </p:sp>
       <p:sp>
         <p:nvSpPr>
-          <p:cNvPr id="1774694090" name="Slide Number Placeholder 6"/>
+          <p:cNvPr id="2029361442" name="Slide Number Placeholder 6"/>
           <p:cNvSpPr>
             <a:spLocks noGrp="1"/>
           </p:cNvSpPr>
@@ -465,7 +465,7 @@
       </p:grpSpPr>
       <p:sp>
         <p:nvSpPr>
-          <p:cNvPr id="978170083" name="Slide Image Placeholder 1"/>
+          <p:cNvPr id="1988116456" name="Slide Image Placeholder 1"/>
           <p:cNvSpPr>
             <a:spLocks noChangeAspect="1" noGrp="1" noRot="1"/>
           </p:cNvSpPr>
@@ -477,7 +477,7 @@
       </p:sp>
       <p:sp>
         <p:nvSpPr>
-          <p:cNvPr id="1717911334" name="Notes Placeholder 2"/>
+          <p:cNvPr id="1284575666" name="Notes Placeholder 2"/>
           <p:cNvSpPr>
             <a:spLocks noGrp="1"/>
           </p:cNvSpPr>
@@ -499,7 +499,7 @@
       </p:sp>
       <p:sp>
         <p:nvSpPr>
-          <p:cNvPr id="1515414215" name="Slide Number Placeholder 3"/>
+          <p:cNvPr id="1971632793" name="Slide Number Placeholder 3"/>
           <p:cNvSpPr>
             <a:spLocks noGrp="1"/>
           </p:cNvSpPr>
@@ -629,7 +629,7 @@
       </p:grpSpPr>
       <p:sp>
         <p:nvSpPr>
-          <p:cNvPr id="1199260368" name="Slide Image Placeholder 1"/>
+          <p:cNvPr id="407345588" name="Slide Image Placeholder 1"/>
           <p:cNvSpPr>
             <a:spLocks noChangeAspect="1" noGrp="1" noRot="1"/>
           </p:cNvSpPr>
@@ -641,7 +641,7 @@
       </p:sp>
       <p:sp>
         <p:nvSpPr>
-          <p:cNvPr id="1106280493" name="Notes Placeholder 2"/>
+          <p:cNvPr id="1797355068" name="Notes Placeholder 2"/>
           <p:cNvSpPr>
             <a:spLocks noGrp="1"/>
           </p:cNvSpPr>
@@ -663,7 +663,7 @@
       </p:sp>
       <p:sp>
         <p:nvSpPr>
-          <p:cNvPr id="1763878695" name="Slide Number Placeholder 3"/>
+          <p:cNvPr id="2143403364" name="Slide Number Placeholder 3"/>
           <p:cNvSpPr>
             <a:spLocks noGrp="1"/>
           </p:cNvSpPr>
@@ -711,7 +711,7 @@
       </p:grpSpPr>
       <p:sp>
         <p:nvSpPr>
-          <p:cNvPr id="1333924464" name="Slide Image Placeholder 1"/>
+          <p:cNvPr id="2074970538" name="Slide Image Placeholder 1"/>
           <p:cNvSpPr>
             <a:spLocks noChangeAspect="1" noGrp="1" noRot="1"/>
           </p:cNvSpPr>
@@ -723,7 +723,7 @@
       </p:sp>
       <p:sp>
         <p:nvSpPr>
-          <p:cNvPr id="1955246505" name="Notes Placeholder 2"/>
+          <p:cNvPr id="1212199802" name="Notes Placeholder 2"/>
           <p:cNvSpPr>
             <a:spLocks noGrp="1"/>
           </p:cNvSpPr>
@@ -745,7 +745,7 @@
       </p:sp>
       <p:sp>
         <p:nvSpPr>
-          <p:cNvPr id="1357280320" name="Slide Number Placeholder 3"/>
+          <p:cNvPr id="903951325" name="Slide Number Placeholder 3"/>
           <p:cNvSpPr>
             <a:spLocks noGrp="1"/>
           </p:cNvSpPr>
@@ -793,7 +793,7 @@
       </p:grpSpPr>
       <p:sp>
         <p:nvSpPr>
-          <p:cNvPr id="2003742509" name="Slide Image Placeholder 1"/>
+          <p:cNvPr id="1310408143" name="Slide Image Placeholder 1"/>
           <p:cNvSpPr>
             <a:spLocks noChangeAspect="1" noGrp="1" noRot="1"/>
           </p:cNvSpPr>
@@ -805,7 +805,7 @@
       </p:sp>
       <p:sp>
         <p:nvSpPr>
-          <p:cNvPr id="1882570059" name="Notes Placeholder 2"/>
+          <p:cNvPr id="1865258108" name="Notes Placeholder 2"/>
           <p:cNvSpPr>
             <a:spLocks noGrp="1"/>
           </p:cNvSpPr>
@@ -827,7 +827,7 @@
       </p:sp>
       <p:sp>
         <p:nvSpPr>
-          <p:cNvPr id="238323134" name="Slide Number Placeholder 3"/>
+          <p:cNvPr id="1578506205" name="Slide Number Placeholder 3"/>
           <p:cNvSpPr>
             <a:spLocks noGrp="1"/>
           </p:cNvSpPr>
@@ -875,7 +875,7 @@
       </p:grpSpPr>
       <p:sp>
         <p:nvSpPr>
-          <p:cNvPr id="1724829986" name="Slide Image Placeholder 1"/>
+          <p:cNvPr id="965874509" name="Slide Image Placeholder 1"/>
           <p:cNvSpPr>
             <a:spLocks noChangeAspect="1" noGrp="1" noRot="1"/>
           </p:cNvSpPr>
@@ -887,7 +887,7 @@
       </p:sp>
       <p:sp>
         <p:nvSpPr>
-          <p:cNvPr id="316970291" name="Notes Placeholder 2"/>
+          <p:cNvPr id="871436816" name="Notes Placeholder 2"/>
           <p:cNvSpPr>
             <a:spLocks noGrp="1"/>
           </p:cNvSpPr>
@@ -909,7 +909,7 @@
       </p:sp>
       <p:sp>
         <p:nvSpPr>
-          <p:cNvPr id="1847713424" name="Slide Number Placeholder 3"/>
+          <p:cNvPr id="1462453034" name="Slide Number Placeholder 3"/>
           <p:cNvSpPr>
             <a:spLocks noGrp="1"/>
           </p:cNvSpPr>
@@ -957,7 +957,7 @@
       </p:grpSpPr>
       <p:sp>
         <p:nvSpPr>
-          <p:cNvPr id="994864683" name="Slide Image Placeholder 1"/>
+          <p:cNvPr id="2123945652" name="Slide Image Placeholder 1"/>
           <p:cNvSpPr>
             <a:spLocks noChangeAspect="1" noGrp="1" noRot="1"/>
           </p:cNvSpPr>
@@ -969,7 +969,7 @@
       </p:sp>
       <p:sp>
         <p:nvSpPr>
-          <p:cNvPr id="69175526" name="Notes Placeholder 2"/>
+          <p:cNvPr id="1822818036" name="Notes Placeholder 2"/>
           <p:cNvSpPr>
             <a:spLocks noGrp="1"/>
           </p:cNvSpPr>
@@ -991,7 +991,7 @@
       </p:sp>
       <p:sp>
         <p:nvSpPr>
-          <p:cNvPr id="487103707" name="Slide Number Placeholder 3"/>
+          <p:cNvPr id="759112036" name="Slide Number Placeholder 3"/>
           <p:cNvSpPr>
             <a:spLocks noGrp="1"/>
           </p:cNvSpPr>
@@ -1039,7 +1039,7 @@
       </p:grpSpPr>
       <p:sp>
         <p:nvSpPr>
-          <p:cNvPr id="1444663740" name="Slide Image Placeholder 1"/>
+          <p:cNvPr id="774427848" name="Slide Image Placeholder 1"/>
           <p:cNvSpPr>
             <a:spLocks noChangeAspect="1" noGrp="1" noRot="1"/>
           </p:cNvSpPr>
@@ -1051,7 +1051,7 @@
       </p:sp>
       <p:sp>
         <p:nvSpPr>
-          <p:cNvPr id="2003017171" name="Notes Placeholder 2"/>
+          <p:cNvPr id="745426046" name="Notes Placeholder 2"/>
           <p:cNvSpPr>
             <a:spLocks noGrp="1"/>
           </p:cNvSpPr>
@@ -1073,7 +1073,7 @@
       </p:sp>
       <p:sp>
         <p:nvSpPr>
-          <p:cNvPr id="328133590" name="Slide Number Placeholder 3"/>
+          <p:cNvPr id="1658434937" name="Slide Number Placeholder 3"/>
           <p:cNvSpPr>
             <a:spLocks noGrp="1"/>
           </p:cNvSpPr>
@@ -1121,7 +1121,7 @@
       </p:grpSpPr>
       <p:sp>
         <p:nvSpPr>
-          <p:cNvPr id="1130089650" name="Slide Image Placeholder 1"/>
+          <p:cNvPr id="1779305451" name="Slide Image Placeholder 1"/>
           <p:cNvSpPr>
             <a:spLocks noChangeAspect="1" noGrp="1" noRot="1"/>
           </p:cNvSpPr>
@@ -1133,7 +1133,7 @@
       </p:sp>
       <p:sp>
         <p:nvSpPr>
-          <p:cNvPr id="1976921032" name="Notes Placeholder 2"/>
+          <p:cNvPr id="1808210384" name="Notes Placeholder 2"/>
           <p:cNvSpPr>
             <a:spLocks noGrp="1"/>
           </p:cNvSpPr>
@@ -1155,7 +1155,7 @@
       </p:sp>
       <p:sp>
         <p:nvSpPr>
-          <p:cNvPr id="1759031915" name="Slide Number Placeholder 3"/>
+          <p:cNvPr id="647286397" name="Slide Number Placeholder 3"/>
           <p:cNvSpPr>
             <a:spLocks noGrp="1"/>
           </p:cNvSpPr>
@@ -1203,7 +1203,7 @@
       </p:grpSpPr>
       <p:sp>
         <p:nvSpPr>
-          <p:cNvPr id="1514229969" name="Slide Image Placeholder 1"/>
+          <p:cNvPr id="795787373" name="Slide Image Placeholder 1"/>
           <p:cNvSpPr>
             <a:spLocks noChangeAspect="1" noGrp="1" noRot="1"/>
           </p:cNvSpPr>
@@ -1215,7 +1215,7 @@
       </p:sp>
       <p:sp>
         <p:nvSpPr>
-          <p:cNvPr id="1050851020" name="Notes Placeholder 2"/>
+          <p:cNvPr id="1492691827" name="Notes Placeholder 2"/>
           <p:cNvSpPr>
             <a:spLocks noGrp="1"/>
           </p:cNvSpPr>
@@ -1237,7 +1237,7 @@
       </p:sp>
       <p:sp>
         <p:nvSpPr>
-          <p:cNvPr id="1060937387" name="Slide Number Placeholder 3"/>
+          <p:cNvPr id="1143846331" name="Slide Number Placeholder 3"/>
           <p:cNvSpPr>
             <a:spLocks noGrp="1"/>
           </p:cNvSpPr>
@@ -1285,7 +1285,7 @@
       </p:grpSpPr>
       <p:sp>
         <p:nvSpPr>
-          <p:cNvPr id="2054290214" name="Slide Image Placeholder 1"/>
+          <p:cNvPr id="605118433" name="Slide Image Placeholder 1"/>
           <p:cNvSpPr>
             <a:spLocks noChangeAspect="1" noGrp="1" noRot="1"/>
           </p:cNvSpPr>
@@ -1297,7 +1297,7 @@
       </p:sp>
       <p:sp>
         <p:nvSpPr>
-          <p:cNvPr id="1184527022" name="Notes Placeholder 2"/>
+          <p:cNvPr id="1165747793" name="Notes Placeholder 2"/>
           <p:cNvSpPr>
             <a:spLocks noGrp="1"/>
           </p:cNvSpPr>
@@ -1319,7 +1319,7 @@
       </p:sp>
       <p:sp>
         <p:nvSpPr>
-          <p:cNvPr id="435410264" name="Slide Number Placeholder 3"/>
+          <p:cNvPr id="1719785430" name="Slide Number Placeholder 3"/>
           <p:cNvSpPr>
             <a:spLocks noGrp="1"/>
           </p:cNvSpPr>
@@ -1367,7 +1367,7 @@
       </p:grpSpPr>
       <p:sp>
         <p:nvSpPr>
-          <p:cNvPr id="1143252248" name="Slide Image Placeholder 1"/>
+          <p:cNvPr id="724219189" name="Slide Image Placeholder 1"/>
           <p:cNvSpPr>
             <a:spLocks noChangeAspect="1" noGrp="1" noRot="1"/>
           </p:cNvSpPr>
@@ -1379,7 +1379,7 @@
       </p:sp>
       <p:sp>
         <p:nvSpPr>
-          <p:cNvPr id="989853572" name="Notes Placeholder 2"/>
+          <p:cNvPr id="381448679" name="Notes Placeholder 2"/>
           <p:cNvSpPr>
             <a:spLocks noGrp="1"/>
           </p:cNvSpPr>
@@ -1401,7 +1401,7 @@
       </p:sp>
       <p:sp>
         <p:nvSpPr>
-          <p:cNvPr id="1940077110" name="Slide Number Placeholder 3"/>
+          <p:cNvPr id="2109996079" name="Slide Number Placeholder 3"/>
           <p:cNvSpPr>
             <a:spLocks noGrp="1"/>
           </p:cNvSpPr>
@@ -1449,7 +1449,7 @@
       </p:grpSpPr>
       <p:sp>
         <p:nvSpPr>
-          <p:cNvPr id="678472036" name="Slide Image Placeholder 1"/>
+          <p:cNvPr id="615722374" name="Slide Image Placeholder 1"/>
           <p:cNvSpPr>
             <a:spLocks noChangeAspect="1" noGrp="1" noRot="1"/>
           </p:cNvSpPr>
@@ -1461,7 +1461,7 @@
       </p:sp>
       <p:sp>
         <p:nvSpPr>
-          <p:cNvPr id="2021373799" name="Notes Placeholder 2"/>
+          <p:cNvPr id="1506534857" name="Notes Placeholder 2"/>
           <p:cNvSpPr>
             <a:spLocks noGrp="1"/>
           </p:cNvSpPr>
@@ -1483,7 +1483,7 @@
       </p:sp>
       <p:sp>
         <p:nvSpPr>
-          <p:cNvPr id="1805780911" name="Slide Number Placeholder 3"/>
+          <p:cNvPr id="304680593" name="Slide Number Placeholder 3"/>
           <p:cNvSpPr>
             <a:spLocks noGrp="1"/>
           </p:cNvSpPr>
@@ -1531,7 +1531,7 @@
       </p:grpSpPr>
       <p:sp>
         <p:nvSpPr>
-          <p:cNvPr id="1418188786" name="Slide Image Placeholder 1"/>
+          <p:cNvPr id="2069393514" name="Slide Image Placeholder 1"/>
           <p:cNvSpPr>
             <a:spLocks noChangeAspect="1" noGrp="1" noRot="1"/>
           </p:cNvSpPr>
@@ -1543,7 +1543,7 @@
       </p:sp>
       <p:sp>
         <p:nvSpPr>
-          <p:cNvPr id="1374848493" name="Notes Placeholder 2"/>
+          <p:cNvPr id="702102749" name="Notes Placeholder 2"/>
           <p:cNvSpPr>
             <a:spLocks noGrp="1"/>
           </p:cNvSpPr>
@@ -1565,7 +1565,7 @@
       </p:sp>
       <p:sp>
         <p:nvSpPr>
-          <p:cNvPr id="811441898" name="Slide Number Placeholder 3"/>
+          <p:cNvPr id="1614290889" name="Slide Number Placeholder 3"/>
           <p:cNvSpPr>
             <a:spLocks noGrp="1"/>
           </p:cNvSpPr>
@@ -1613,7 +1613,7 @@
       </p:grpSpPr>
       <p:sp>
         <p:nvSpPr>
-          <p:cNvPr id="401907762" name="Slide Image Placeholder 1"/>
+          <p:cNvPr id="2059815843" name="Slide Image Placeholder 1"/>
           <p:cNvSpPr>
             <a:spLocks noChangeAspect="1" noGrp="1" noRot="1"/>
           </p:cNvSpPr>
@@ -1625,7 +1625,7 @@
       </p:sp>
       <p:sp>
         <p:nvSpPr>
-          <p:cNvPr id="263647928" name="Notes Placeholder 2"/>
+          <p:cNvPr id="1820836049" name="Notes Placeholder 2"/>
           <p:cNvSpPr>
             <a:spLocks noGrp="1"/>
           </p:cNvSpPr>
@@ -1647,7 +1647,7 @@
       </p:sp>
       <p:sp>
         <p:nvSpPr>
-          <p:cNvPr id="1432471382" name="Slide Number Placeholder 3"/>
+          <p:cNvPr id="2035635185" name="Slide Number Placeholder 3"/>
           <p:cNvSpPr>
             <a:spLocks noGrp="1"/>
           </p:cNvSpPr>
@@ -1695,7 +1695,7 @@
       </p:grpSpPr>
       <p:sp>
         <p:nvSpPr>
-          <p:cNvPr id="710456672" name="Slide Image Placeholder 1"/>
+          <p:cNvPr id="43404134" name="Slide Image Placeholder 1"/>
           <p:cNvSpPr>
             <a:spLocks noChangeAspect="1" noGrp="1" noRot="1"/>
           </p:cNvSpPr>
@@ -1707,7 +1707,7 @@
       </p:sp>
       <p:sp>
         <p:nvSpPr>
-          <p:cNvPr id="613878659" name="Notes Placeholder 2"/>
+          <p:cNvPr id="726884870" name="Notes Placeholder 2"/>
           <p:cNvSpPr>
             <a:spLocks noGrp="1"/>
           </p:cNvSpPr>
@@ -1729,7 +1729,7 @@
       </p:sp>
       <p:sp>
         <p:nvSpPr>
-          <p:cNvPr id="755866882" name="Slide Number Placeholder 3"/>
+          <p:cNvPr id="1279706098" name="Slide Number Placeholder 3"/>
           <p:cNvSpPr>
             <a:spLocks noGrp="1"/>
           </p:cNvSpPr>
@@ -1777,7 +1777,7 @@
       </p:grpSpPr>
       <p:sp>
         <p:nvSpPr>
-          <p:cNvPr id="1221915408" name="Slide Image Placeholder 1"/>
+          <p:cNvPr id="1116196208" name="Slide Image Placeholder 1"/>
           <p:cNvSpPr>
             <a:spLocks noChangeAspect="1" noGrp="1" noRot="1"/>
           </p:cNvSpPr>
@@ -1789,7 +1789,7 @@
       </p:sp>
       <p:sp>
         <p:nvSpPr>
-          <p:cNvPr id="854121380" name="Notes Placeholder 2"/>
+          <p:cNvPr id="1319378736" name="Notes Placeholder 2"/>
           <p:cNvSpPr>
             <a:spLocks noGrp="1"/>
           </p:cNvSpPr>
@@ -1811,7 +1811,7 @@
       </p:sp>
       <p:sp>
         <p:nvSpPr>
-          <p:cNvPr id="612400911" name="Slide Number Placeholder 3"/>
+          <p:cNvPr id="747140944" name="Slide Number Placeholder 3"/>
           <p:cNvSpPr>
             <a:spLocks noGrp="1"/>
           </p:cNvSpPr>
@@ -1859,7 +1859,7 @@
       </p:grpSpPr>
       <p:sp>
         <p:nvSpPr>
-          <p:cNvPr id="2139164692" name="Title 1"/>
+          <p:cNvPr id="2131247372" name="Title 1"/>
           <p:cNvSpPr>
             <a:spLocks noGrp="1"/>
           </p:cNvSpPr>
@@ -1894,7 +1894,7 @@
       </p:sp>
       <p:sp>
         <p:nvSpPr>
-          <p:cNvPr id="766725452" name="Subtitle 2"/>
+          <p:cNvPr id="1926763468" name="Subtitle 2"/>
           <p:cNvSpPr>
             <a:spLocks noGrp="1"/>
           </p:cNvSpPr>
@@ -1962,7 +1962,7 @@
       </p:sp>
       <p:sp>
         <p:nvSpPr>
-          <p:cNvPr id="653033566" name="Date Placeholder 3"/>
+          <p:cNvPr id="143358153" name="Date Placeholder 3"/>
           <p:cNvSpPr>
             <a:spLocks noGrp="1"/>
           </p:cNvSpPr>
@@ -1988,7 +1988,7 @@
       </p:sp>
       <p:sp>
         <p:nvSpPr>
-          <p:cNvPr id="694402216" name="Footer Placeholder 4"/>
+          <p:cNvPr id="279561523" name="Footer Placeholder 4"/>
           <p:cNvSpPr>
             <a:spLocks noGrp="1"/>
           </p:cNvSpPr>
@@ -2010,7 +2010,7 @@
       </p:sp>
       <p:sp>
         <p:nvSpPr>
-          <p:cNvPr id="1411341478" name="Slide Number Placeholder 5"/>
+          <p:cNvPr id="1397107189" name="Slide Number Placeholder 5"/>
           <p:cNvSpPr>
             <a:spLocks noGrp="1"/>
           </p:cNvSpPr>
@@ -2061,7 +2061,7 @@
       </p:grpSpPr>
       <p:sp>
         <p:nvSpPr>
-          <p:cNvPr id="550594256" name="Title 1"/>
+          <p:cNvPr id="58684336" name="Title 1"/>
           <p:cNvSpPr>
             <a:spLocks noGrp="1"/>
           </p:cNvSpPr>
@@ -2087,7 +2087,7 @@
       </p:sp>
       <p:sp>
         <p:nvSpPr>
-          <p:cNvPr id="711096424" name="Vertical Text Placeholder 2"/>
+          <p:cNvPr id="1987149351" name="Vertical Text Placeholder 2"/>
           <p:cNvSpPr>
             <a:spLocks noGrp="1"/>
           </p:cNvSpPr>
@@ -2153,7 +2153,7 @@
       </p:sp>
       <p:sp>
         <p:nvSpPr>
-          <p:cNvPr id="899536987" name="Date Placeholder 3"/>
+          <p:cNvPr id="482318626" name="Date Placeholder 3"/>
           <p:cNvSpPr>
             <a:spLocks noGrp="1"/>
           </p:cNvSpPr>
@@ -2179,7 +2179,7 @@
       </p:sp>
       <p:sp>
         <p:nvSpPr>
-          <p:cNvPr id="2073818120" name="Footer Placeholder 4"/>
+          <p:cNvPr id="651952332" name="Footer Placeholder 4"/>
           <p:cNvSpPr>
             <a:spLocks noGrp="1"/>
           </p:cNvSpPr>
@@ -2201,7 +2201,7 @@
       </p:sp>
       <p:sp>
         <p:nvSpPr>
-          <p:cNvPr id="1612636458" name="Slide Number Placeholder 5"/>
+          <p:cNvPr id="1312535966" name="Slide Number Placeholder 5"/>
           <p:cNvSpPr>
             <a:spLocks noGrp="1"/>
           </p:cNvSpPr>
@@ -2252,7 +2252,7 @@
       </p:grpSpPr>
       <p:sp>
         <p:nvSpPr>
-          <p:cNvPr id="1304880789" name="Vertical Title 1"/>
+          <p:cNvPr id="733485636" name="Vertical Title 1"/>
           <p:cNvSpPr>
             <a:spLocks noGrp="1"/>
           </p:cNvSpPr>
@@ -2283,7 +2283,7 @@
       </p:sp>
       <p:sp>
         <p:nvSpPr>
-          <p:cNvPr id="565269874" name="Vertical Text Placeholder 2"/>
+          <p:cNvPr id="85077958" name="Vertical Text Placeholder 2"/>
           <p:cNvSpPr>
             <a:spLocks noGrp="1"/>
           </p:cNvSpPr>
@@ -2354,7 +2354,7 @@
       </p:sp>
       <p:sp>
         <p:nvSpPr>
-          <p:cNvPr id="830932118" name="Date Placeholder 3"/>
+          <p:cNvPr id="725959810" name="Date Placeholder 3"/>
           <p:cNvSpPr>
             <a:spLocks noGrp="1"/>
           </p:cNvSpPr>
@@ -2380,7 +2380,7 @@
       </p:sp>
       <p:sp>
         <p:nvSpPr>
-          <p:cNvPr id="1859665118" name="Footer Placeholder 4"/>
+          <p:cNvPr id="2124750470" name="Footer Placeholder 4"/>
           <p:cNvSpPr>
             <a:spLocks noGrp="1"/>
           </p:cNvSpPr>
@@ -2402,7 +2402,7 @@
       </p:sp>
       <p:sp>
         <p:nvSpPr>
-          <p:cNvPr id="2140895371" name="Slide Number Placeholder 5"/>
+          <p:cNvPr id="1205168066" name="Slide Number Placeholder 5"/>
           <p:cNvSpPr>
             <a:spLocks noGrp="1"/>
           </p:cNvSpPr>
@@ -2453,7 +2453,7 @@
       </p:grpSpPr>
       <p:sp>
         <p:nvSpPr>
-          <p:cNvPr id="316777176" name="Title 1"/>
+          <p:cNvPr id="518062183" name="Title 1"/>
           <p:cNvSpPr>
             <a:spLocks noGrp="1"/>
           </p:cNvSpPr>
@@ -2479,7 +2479,7 @@
       </p:sp>
       <p:sp>
         <p:nvSpPr>
-          <p:cNvPr id="1531507191" name="Content Placeholder 2"/>
+          <p:cNvPr id="1177708938" name="Content Placeholder 2"/>
           <p:cNvSpPr>
             <a:spLocks noGrp="1"/>
           </p:cNvSpPr>
@@ -2545,7 +2545,7 @@
       </p:sp>
       <p:sp>
         <p:nvSpPr>
-          <p:cNvPr id="1508607515" name="Date Placeholder 3"/>
+          <p:cNvPr id="1943993473" name="Date Placeholder 3"/>
           <p:cNvSpPr>
             <a:spLocks noGrp="1"/>
           </p:cNvSpPr>
@@ -2571,7 +2571,7 @@
       </p:sp>
       <p:sp>
         <p:nvSpPr>
-          <p:cNvPr id="26321528" name="Footer Placeholder 4"/>
+          <p:cNvPr id="1350011583" name="Footer Placeholder 4"/>
           <p:cNvSpPr>
             <a:spLocks noGrp="1"/>
           </p:cNvSpPr>
@@ -2593,7 +2593,7 @@
       </p:sp>
       <p:sp>
         <p:nvSpPr>
-          <p:cNvPr id="798551474" name="Slide Number Placeholder 5"/>
+          <p:cNvPr id="653638341" name="Slide Number Placeholder 5"/>
           <p:cNvSpPr>
             <a:spLocks noGrp="1"/>
           </p:cNvSpPr>
@@ -2644,7 +2644,7 @@
       </p:grpSpPr>
       <p:sp>
         <p:nvSpPr>
-          <p:cNvPr id="668696016" name="Title 1"/>
+          <p:cNvPr id="1398794458" name="Title 1"/>
           <p:cNvSpPr>
             <a:spLocks noGrp="1"/>
           </p:cNvSpPr>
@@ -2679,7 +2679,7 @@
       </p:sp>
       <p:sp>
         <p:nvSpPr>
-          <p:cNvPr id="221987991" name="Text Placeholder 2"/>
+          <p:cNvPr id="1830253337" name="Text Placeholder 2"/>
           <p:cNvSpPr>
             <a:spLocks noGrp="1"/>
           </p:cNvSpPr>
@@ -2801,7 +2801,7 @@
       </p:sp>
       <p:sp>
         <p:nvSpPr>
-          <p:cNvPr id="189389529" name="Date Placeholder 3"/>
+          <p:cNvPr id="1673398503" name="Date Placeholder 3"/>
           <p:cNvSpPr>
             <a:spLocks noGrp="1"/>
           </p:cNvSpPr>
@@ -2827,7 +2827,7 @@
       </p:sp>
       <p:sp>
         <p:nvSpPr>
-          <p:cNvPr id="1047337790" name="Footer Placeholder 4"/>
+          <p:cNvPr id="804575353" name="Footer Placeholder 4"/>
           <p:cNvSpPr>
             <a:spLocks noGrp="1"/>
           </p:cNvSpPr>
@@ -2849,7 +2849,7 @@
       </p:sp>
       <p:sp>
         <p:nvSpPr>
-          <p:cNvPr id="942599513" name="Slide Number Placeholder 5"/>
+          <p:cNvPr id="1314771910" name="Slide Number Placeholder 5"/>
           <p:cNvSpPr>
             <a:spLocks noGrp="1"/>
           </p:cNvSpPr>
@@ -2900,7 +2900,7 @@
       </p:grpSpPr>
       <p:sp>
         <p:nvSpPr>
-          <p:cNvPr id="959359202" name="Title 1"/>
+          <p:cNvPr id="1738937371" name="Title 1"/>
           <p:cNvSpPr>
             <a:spLocks noGrp="1"/>
           </p:cNvSpPr>
@@ -2926,7 +2926,7 @@
       </p:sp>
       <p:sp>
         <p:nvSpPr>
-          <p:cNvPr id="2136229110" name="Content Placeholder 2"/>
+          <p:cNvPr id="220306334" name="Content Placeholder 2"/>
           <p:cNvSpPr>
             <a:spLocks noGrp="1"/>
           </p:cNvSpPr>
@@ -2997,7 +2997,7 @@
       </p:sp>
       <p:sp>
         <p:nvSpPr>
-          <p:cNvPr id="346056778" name="Content Placeholder 3"/>
+          <p:cNvPr id="1433506703" name="Content Placeholder 3"/>
           <p:cNvSpPr>
             <a:spLocks noGrp="1"/>
           </p:cNvSpPr>
@@ -3068,7 +3068,7 @@
       </p:sp>
       <p:sp>
         <p:nvSpPr>
-          <p:cNvPr id="1177411221" name="Date Placeholder 4"/>
+          <p:cNvPr id="1305328040" name="Date Placeholder 4"/>
           <p:cNvSpPr>
             <a:spLocks noGrp="1"/>
           </p:cNvSpPr>
@@ -3094,7 +3094,7 @@
       </p:sp>
       <p:sp>
         <p:nvSpPr>
-          <p:cNvPr id="232477440" name="Footer Placeholder 5"/>
+          <p:cNvPr id="1476984034" name="Footer Placeholder 5"/>
           <p:cNvSpPr>
             <a:spLocks noGrp="1"/>
           </p:cNvSpPr>
@@ -3116,7 +3116,7 @@
       </p:sp>
       <p:sp>
         <p:nvSpPr>
-          <p:cNvPr id="1413878896" name="Slide Number Placeholder 6"/>
+          <p:cNvPr id="592184803" name="Slide Number Placeholder 6"/>
           <p:cNvSpPr>
             <a:spLocks noGrp="1"/>
           </p:cNvSpPr>
@@ -3167,7 +3167,7 @@
       </p:grpSpPr>
       <p:sp>
         <p:nvSpPr>
-          <p:cNvPr id="1249909162" name="Title 1"/>
+          <p:cNvPr id="587858527" name="Title 1"/>
           <p:cNvSpPr>
             <a:spLocks noGrp="1"/>
           </p:cNvSpPr>
@@ -3198,7 +3198,7 @@
       </p:sp>
       <p:sp>
         <p:nvSpPr>
-          <p:cNvPr id="1214793655" name="Text Placeholder 2"/>
+          <p:cNvPr id="1597814877" name="Text Placeholder 2"/>
           <p:cNvSpPr>
             <a:spLocks noGrp="1"/>
           </p:cNvSpPr>
@@ -3266,7 +3266,7 @@
       </p:sp>
       <p:sp>
         <p:nvSpPr>
-          <p:cNvPr id="1000189630" name="Content Placeholder 3"/>
+          <p:cNvPr id="228332392" name="Content Placeholder 3"/>
           <p:cNvSpPr>
             <a:spLocks noGrp="1"/>
           </p:cNvSpPr>
@@ -3337,7 +3337,7 @@
       </p:sp>
       <p:sp>
         <p:nvSpPr>
-          <p:cNvPr id="1257761766" name="Text Placeholder 4"/>
+          <p:cNvPr id="2103051803" name="Text Placeholder 4"/>
           <p:cNvSpPr>
             <a:spLocks noGrp="1"/>
           </p:cNvSpPr>
@@ -3405,7 +3405,7 @@
       </p:sp>
       <p:sp>
         <p:nvSpPr>
-          <p:cNvPr id="710170209" name="Content Placeholder 5"/>
+          <p:cNvPr id="512123933" name="Content Placeholder 5"/>
           <p:cNvSpPr>
             <a:spLocks noGrp="1"/>
           </p:cNvSpPr>
@@ -3476,7 +3476,7 @@
       </p:sp>
       <p:sp>
         <p:nvSpPr>
-          <p:cNvPr id="1867883011" name="Date Placeholder 6"/>
+          <p:cNvPr id="2103005771" name="Date Placeholder 6"/>
           <p:cNvSpPr>
             <a:spLocks noGrp="1"/>
           </p:cNvSpPr>
@@ -3502,7 +3502,7 @@
       </p:sp>
       <p:sp>
         <p:nvSpPr>
-          <p:cNvPr id="205164254" name="Footer Placeholder 7"/>
+          <p:cNvPr id="2037309294" name="Footer Placeholder 7"/>
           <p:cNvSpPr>
             <a:spLocks noGrp="1"/>
           </p:cNvSpPr>
@@ -3524,7 +3524,7 @@
       </p:sp>
       <p:sp>
         <p:nvSpPr>
-          <p:cNvPr id="389882702" name="Slide Number Placeholder 8"/>
+          <p:cNvPr id="599470478" name="Slide Number Placeholder 8"/>
           <p:cNvSpPr>
             <a:spLocks noGrp="1"/>
           </p:cNvSpPr>
@@ -3575,7 +3575,7 @@
       </p:grpSpPr>
       <p:sp>
         <p:nvSpPr>
-          <p:cNvPr id="1555802748" name="Title 1"/>
+          <p:cNvPr id="547765403" name="Title 1"/>
           <p:cNvSpPr>
             <a:spLocks noGrp="1"/>
           </p:cNvSpPr>
@@ -3601,7 +3601,7 @@
       </p:sp>
       <p:sp>
         <p:nvSpPr>
-          <p:cNvPr id="1905916778" name="Date Placeholder 2"/>
+          <p:cNvPr id="1946418792" name="Date Placeholder 2"/>
           <p:cNvSpPr>
             <a:spLocks noGrp="1"/>
           </p:cNvSpPr>
@@ -3627,7 +3627,7 @@
       </p:sp>
       <p:sp>
         <p:nvSpPr>
-          <p:cNvPr id="1996232775" name="Footer Placeholder 3"/>
+          <p:cNvPr id="2017511567" name="Footer Placeholder 3"/>
           <p:cNvSpPr>
             <a:spLocks noGrp="1"/>
           </p:cNvSpPr>
@@ -3649,7 +3649,7 @@
       </p:sp>
       <p:sp>
         <p:nvSpPr>
-          <p:cNvPr id="23390320" name="Slide Number Placeholder 4"/>
+          <p:cNvPr id="102227227" name="Slide Number Placeholder 4"/>
           <p:cNvSpPr>
             <a:spLocks noGrp="1"/>
           </p:cNvSpPr>
@@ -3700,7 +3700,7 @@
       </p:grpSpPr>
       <p:sp>
         <p:nvSpPr>
-          <p:cNvPr id="1722669274" name="Date Placeholder 1"/>
+          <p:cNvPr id="176263044" name="Date Placeholder 1"/>
           <p:cNvSpPr>
             <a:spLocks noGrp="1"/>
           </p:cNvSpPr>
@@ -3726,7 +3726,7 @@
       </p:sp>
       <p:sp>
         <p:nvSpPr>
-          <p:cNvPr id="399618242" name="Footer Placeholder 2"/>
+          <p:cNvPr id="2069323329" name="Footer Placeholder 2"/>
           <p:cNvSpPr>
             <a:spLocks noGrp="1"/>
           </p:cNvSpPr>
@@ -3748,7 +3748,7 @@
       </p:sp>
       <p:sp>
         <p:nvSpPr>
-          <p:cNvPr id="1269886608" name="Slide Number Placeholder 3"/>
+          <p:cNvPr id="1879679985" name="Slide Number Placeholder 3"/>
           <p:cNvSpPr>
             <a:spLocks noGrp="1"/>
           </p:cNvSpPr>
@@ -3799,7 +3799,7 @@
       </p:grpSpPr>
       <p:sp>
         <p:nvSpPr>
-          <p:cNvPr id="415981149" name="Title 1"/>
+          <p:cNvPr id="999265562" name="Title 1"/>
           <p:cNvSpPr>
             <a:spLocks noGrp="1"/>
           </p:cNvSpPr>
@@ -3834,7 +3834,7 @@
       </p:sp>
       <p:sp>
         <p:nvSpPr>
-          <p:cNvPr id="522787278" name="Content Placeholder 2"/>
+          <p:cNvPr id="1156087109" name="Content Placeholder 2"/>
           <p:cNvSpPr>
             <a:spLocks noGrp="1"/>
           </p:cNvSpPr>
@@ -3933,7 +3933,7 @@
       </p:sp>
       <p:sp>
         <p:nvSpPr>
-          <p:cNvPr id="900206739" name="Text Placeholder 3"/>
+          <p:cNvPr id="832615578" name="Text Placeholder 3"/>
           <p:cNvSpPr>
             <a:spLocks noGrp="1"/>
           </p:cNvSpPr>
@@ -4001,7 +4001,7 @@
       </p:sp>
       <p:sp>
         <p:nvSpPr>
-          <p:cNvPr id="1034121345" name="Date Placeholder 4"/>
+          <p:cNvPr id="1709959412" name="Date Placeholder 4"/>
           <p:cNvSpPr>
             <a:spLocks noGrp="1"/>
           </p:cNvSpPr>
@@ -4027,7 +4027,7 @@
       </p:sp>
       <p:sp>
         <p:nvSpPr>
-          <p:cNvPr id="919879899" name="Footer Placeholder 5"/>
+          <p:cNvPr id="1418362370" name="Footer Placeholder 5"/>
           <p:cNvSpPr>
             <a:spLocks noGrp="1"/>
           </p:cNvSpPr>
@@ -4049,7 +4049,7 @@
       </p:sp>
       <p:sp>
         <p:nvSpPr>
-          <p:cNvPr id="363196503" name="Slide Number Placeholder 6"/>
+          <p:cNvPr id="1808206298" name="Slide Number Placeholder 6"/>
           <p:cNvSpPr>
             <a:spLocks noGrp="1"/>
           </p:cNvSpPr>
@@ -4100,7 +4100,7 @@
       </p:grpSpPr>
       <p:sp>
         <p:nvSpPr>
-          <p:cNvPr id="295196939" name="Title 1"/>
+          <p:cNvPr id="563392544" name="Title 1"/>
           <p:cNvSpPr>
             <a:spLocks noGrp="1"/>
           </p:cNvSpPr>
@@ -4135,7 +4135,7 @@
       </p:sp>
       <p:sp>
         <p:nvSpPr>
-          <p:cNvPr id="1709146104" name="Picture Placeholder 2"/>
+          <p:cNvPr id="600213740" name="Picture Placeholder 2"/>
           <p:cNvSpPr>
             <a:spLocks noGrp="1"/>
           </p:cNvSpPr>
@@ -4199,7 +4199,7 @@
       </p:sp>
       <p:sp>
         <p:nvSpPr>
-          <p:cNvPr id="1473573354" name="Text Placeholder 3"/>
+          <p:cNvPr id="1315135814" name="Text Placeholder 3"/>
           <p:cNvSpPr>
             <a:spLocks noGrp="1"/>
           </p:cNvSpPr>
@@ -4267,7 +4267,7 @@
       </p:sp>
       <p:sp>
         <p:nvSpPr>
-          <p:cNvPr id="1212264529" name="Date Placeholder 4"/>
+          <p:cNvPr id="69830976" name="Date Placeholder 4"/>
           <p:cNvSpPr>
             <a:spLocks noGrp="1"/>
           </p:cNvSpPr>
@@ -4293,7 +4293,7 @@
       </p:sp>
       <p:sp>
         <p:nvSpPr>
-          <p:cNvPr id="1887015369" name="Footer Placeholder 5"/>
+          <p:cNvPr id="28817451" name="Footer Placeholder 5"/>
           <p:cNvSpPr>
             <a:spLocks noGrp="1"/>
           </p:cNvSpPr>
@@ -4315,7 +4315,7 @@
       </p:sp>
       <p:sp>
         <p:nvSpPr>
-          <p:cNvPr id="1276031516" name="Slide Number Placeholder 6"/>
+          <p:cNvPr id="635821621" name="Slide Number Placeholder 6"/>
           <p:cNvSpPr>
             <a:spLocks noGrp="1"/>
           </p:cNvSpPr>
@@ -4371,7 +4371,7 @@
       </p:grpSpPr>
       <p:sp>
         <p:nvSpPr>
-          <p:cNvPr id="476347215" name="Title Placeholder 1"/>
+          <p:cNvPr id="363781205" name="Title Placeholder 1"/>
           <p:cNvSpPr>
             <a:spLocks noGrp="1"/>
           </p:cNvSpPr>
@@ -4407,7 +4407,7 @@
       </p:sp>
       <p:sp>
         <p:nvSpPr>
-          <p:cNvPr id="585382551" name="Text Placeholder 2"/>
+          <p:cNvPr id="1114895018" name="Text Placeholder 2"/>
           <p:cNvSpPr>
             <a:spLocks noGrp="1"/>
           </p:cNvSpPr>
@@ -4483,7 +4483,7 @@
       </p:sp>
       <p:sp>
         <p:nvSpPr>
-          <p:cNvPr id="276813515" name="Date Placeholder 3"/>
+          <p:cNvPr id="548700532" name="Date Placeholder 3"/>
           <p:cNvSpPr>
             <a:spLocks noGrp="1"/>
           </p:cNvSpPr>
@@ -4527,7 +4527,7 @@
       </p:sp>
       <p:sp>
         <p:nvSpPr>
-          <p:cNvPr id="400907032" name="Footer Placeholder 4"/>
+          <p:cNvPr id="2065311204" name="Footer Placeholder 4"/>
           <p:cNvSpPr>
             <a:spLocks noGrp="1"/>
           </p:cNvSpPr>
@@ -4567,7 +4567,7 @@
       </p:sp>
       <p:sp>
         <p:nvSpPr>
-          <p:cNvPr id="1998202167" name="Slide Number Placeholder 5"/>
+          <p:cNvPr id="1043006905" name="Slide Number Placeholder 5"/>
           <p:cNvSpPr>
             <a:spLocks noGrp="1"/>
           </p:cNvSpPr>
@@ -4934,7 +4934,7 @@
       </p:grpSpPr>
       <p:sp>
         <p:nvSpPr>
-          <p:cNvPr id="1449677296" name="Title 1"/>
+          <p:cNvPr id="1445897376" name="Title 1"/>
           <p:cNvSpPr>
             <a:spLocks noGrp="1"/>
           </p:cNvSpPr>
@@ -4969,7 +4969,7 @@
       </p:sp>
       <p:sp>
         <p:nvSpPr>
-          <p:cNvPr id="903551271" name="Subtitle 2"/>
+          <p:cNvPr id="1946968923" name="Subtitle 2"/>
           <p:cNvSpPr>
             <a:spLocks noGrp="1"/>
           </p:cNvSpPr>
@@ -5092,7 +5092,7 @@
       </p:sp>
       <p:pic>
         <p:nvPicPr>
-          <p:cNvPr id="759494127" name="Picture 3"/>
+          <p:cNvPr id="1813956913" name="Picture 3"/>
           <p:cNvPicPr>
             <a:picLocks noChangeAspect="1"/>
           </p:cNvPicPr>
@@ -6445,7 +6445,7 @@
       </p:grpSpPr>
       <p:sp>
         <p:nvSpPr>
-          <p:cNvPr id="234899011" name="Title 1"/>
+          <p:cNvPr id="392744841" name="Title 1"/>
           <p:cNvSpPr>
             <a:spLocks noGrp="1"/>
           </p:cNvSpPr>
@@ -6483,7 +6483,7 @@
       </p:sp>
       <p:sp>
         <p:nvSpPr>
-          <p:cNvPr id="151997365" name="Content Placeholder 2"/>
+          <p:cNvPr id="1494432815" name="Content Placeholder 2"/>
           <p:cNvSpPr>
             <a:spLocks noGrp="1"/>
           </p:cNvSpPr>
@@ -7046,7 +7046,7 @@
       </p:sp>
       <p:pic>
         <p:nvPicPr>
-          <p:cNvPr id="1258895591" name="Picture 3"/>
+          <p:cNvPr id="106959758" name="Picture 3"/>
           <p:cNvPicPr>
             <a:picLocks noChangeAspect="1"/>
           </p:cNvPicPr>
@@ -7068,7 +7068,7 @@
       </p:pic>
       <p:graphicFrame>
         <p:nvGraphicFramePr>
-          <p:cNvPr id="1999980960" name=""/>
+          <p:cNvPr id="391789063" name=""/>
           <p:cNvGraphicFramePr>
             <a:graphicFrameLocks xmlns:a="http://schemas.openxmlformats.org/drawingml/2006/main"/>
           </p:cNvGraphicFramePr>
@@ -7527,7 +7527,7 @@
       </p:grpSpPr>
       <p:sp>
         <p:nvSpPr>
-          <p:cNvPr id="476667405" name="Title 1"/>
+          <p:cNvPr id="1856530284" name="Title 1"/>
           <p:cNvSpPr>
             <a:spLocks noGrp="1"/>
           </p:cNvSpPr>
@@ -7565,7 +7565,7 @@
       </p:sp>
       <p:sp>
         <p:nvSpPr>
-          <p:cNvPr id="1090424905" name="Content Placeholder 2"/>
+          <p:cNvPr id="221499134" name="Content Placeholder 2"/>
           <p:cNvSpPr>
             <a:spLocks noGrp="1"/>
           </p:cNvSpPr>
@@ -7636,7 +7636,7 @@
       </p:sp>
       <p:pic>
         <p:nvPicPr>
-          <p:cNvPr id="984878823" name="Picture 3"/>
+          <p:cNvPr id="1630148198" name="Picture 3"/>
           <p:cNvPicPr>
             <a:picLocks noChangeAspect="1"/>
           </p:cNvPicPr>
@@ -7658,7 +7658,7 @@
       </p:pic>
       <p:graphicFrame>
         <p:nvGraphicFramePr>
-          <p:cNvPr id="1377394628" name=""/>
+          <p:cNvPr id="1393182934" name=""/>
           <p:cNvGraphicFramePr>
             <a:graphicFrameLocks xmlns:a="http://schemas.openxmlformats.org/drawingml/2006/main"/>
           </p:cNvGraphicFramePr>
@@ -8175,7 +8175,7 @@
       </p:graphicFrame>
       <p:sp>
         <p:nvSpPr>
-          <p:cNvPr id="1835692892" name=""/>
+          <p:cNvPr id="1310061270" name=""/>
           <p:cNvSpPr/>
           <p:nvPr/>
         </p:nvSpPr>
@@ -8361,7 +8361,7 @@
       </p:sp>
       <p:pic>
         <p:nvPicPr>
-          <p:cNvPr id="1064547819" name=""/>
+          <p:cNvPr id="1716269578" name=""/>
           <p:cNvPicPr>
             <a:picLocks noChangeAspect="1"/>
           </p:cNvPicPr>
@@ -8423,7 +8423,7 @@
       </p:grpSpPr>
       <p:sp>
         <p:nvSpPr>
-          <p:cNvPr id="838286860" name="Title 1"/>
+          <p:cNvPr id="89849864" name="Title 1"/>
           <p:cNvSpPr>
             <a:spLocks noGrp="1"/>
           </p:cNvSpPr>
@@ -8461,7 +8461,7 @@
       </p:sp>
       <p:sp>
         <p:nvSpPr>
-          <p:cNvPr id="612927293" name="Content Placeholder 2"/>
+          <p:cNvPr id="939753822" name="Content Placeholder 2"/>
           <p:cNvSpPr>
             <a:spLocks noGrp="1"/>
           </p:cNvSpPr>
@@ -8525,7 +8525,7 @@
       </p:sp>
       <p:pic>
         <p:nvPicPr>
-          <p:cNvPr id="846136425" name="Picture 3"/>
+          <p:cNvPr id="791301729" name="Picture 3"/>
           <p:cNvPicPr>
             <a:picLocks noChangeAspect="1"/>
           </p:cNvPicPr>
@@ -8547,7 +8547,7 @@
       </p:pic>
       <p:pic>
         <p:nvPicPr>
-          <p:cNvPr id="238635338" name=""/>
+          <p:cNvPr id="2076901511" name=""/>
           <p:cNvPicPr>
             <a:picLocks noChangeAspect="1"/>
           </p:cNvPicPr>
@@ -8609,7 +8609,7 @@
       </p:grpSpPr>
       <p:sp>
         <p:nvSpPr>
-          <p:cNvPr id="647846038" name="Title 1"/>
+          <p:cNvPr id="33886233" name="Title 1"/>
           <p:cNvSpPr>
             <a:spLocks noGrp="1"/>
           </p:cNvSpPr>
@@ -8647,7 +8647,7 @@
       </p:sp>
       <p:sp>
         <p:nvSpPr>
-          <p:cNvPr id="1672766165" name="Content Placeholder 2"/>
+          <p:cNvPr id="1086192359" name="Content Placeholder 2"/>
           <p:cNvSpPr>
             <a:spLocks noGrp="1"/>
           </p:cNvSpPr>
@@ -8698,7 +8698,7 @@
       </p:sp>
       <p:pic>
         <p:nvPicPr>
-          <p:cNvPr id="1284304539" name="Picture 3"/>
+          <p:cNvPr id="147869623" name="Picture 3"/>
           <p:cNvPicPr>
             <a:picLocks noChangeAspect="1"/>
           </p:cNvPicPr>
@@ -8720,7 +8720,7 @@
       </p:pic>
       <p:pic>
         <p:nvPicPr>
-          <p:cNvPr id="890817227" name=""/>
+          <p:cNvPr id="536325337" name=""/>
           <p:cNvPicPr>
             <a:picLocks noChangeAspect="1"/>
           </p:cNvPicPr>
@@ -8782,7 +8782,7 @@
       </p:grpSpPr>
       <p:sp>
         <p:nvSpPr>
-          <p:cNvPr id="76212177" name="Title 1"/>
+          <p:cNvPr id="4408975" name="Title 1"/>
           <p:cNvSpPr>
             <a:spLocks noGrp="1"/>
           </p:cNvSpPr>
@@ -8820,7 +8820,7 @@
       </p:sp>
       <p:sp>
         <p:nvSpPr>
-          <p:cNvPr id="1903684226" name="Content Placeholder 2"/>
+          <p:cNvPr id="806056786" name="Content Placeholder 2"/>
           <p:cNvSpPr>
             <a:spLocks noGrp="1"/>
           </p:cNvSpPr>
@@ -8830,7 +8830,7 @@
         </p:nvSpPr>
         <p:spPr bwMode="auto">
           <a:xfrm flipH="0" flipV="0">
-            <a:off x="295034" y="765121"/>
+            <a:off x="152604" y="765120"/>
             <a:ext cx="11196689" cy="5982711"/>
           </a:xfrm>
         </p:spPr>
@@ -9074,7 +9074,7 @@
       </p:sp>
       <p:pic>
         <p:nvPicPr>
-          <p:cNvPr id="518379521" name="Picture 3"/>
+          <p:cNvPr id="355828336" name="Picture 3"/>
           <p:cNvPicPr>
             <a:picLocks noChangeAspect="1"/>
           </p:cNvPicPr>
@@ -9096,7 +9096,7 @@
       </p:pic>
       <p:sp>
         <p:nvSpPr>
-          <p:cNvPr id="425125286" name=""/>
+          <p:cNvPr id="1633046949" name=""/>
           <p:cNvSpPr txBox="1"/>
           <p:nvPr/>
         </p:nvSpPr>
@@ -9122,6 +9122,28 @@
           </a:p>
         </p:txBody>
       </p:sp>
+      <p:pic>
+        <p:nvPicPr>
+          <p:cNvPr id="1640399383" name=""/>
+          <p:cNvPicPr>
+            <a:picLocks noChangeAspect="1"/>
+          </p:cNvPicPr>
+          <p:nvPr/>
+        </p:nvPicPr>
+        <p:blipFill>
+          <a:blip r:embed="rId4"/>
+          <a:stretch/>
+        </p:blipFill>
+        <p:spPr bwMode="auto">
+          <a:xfrm flipH="0" flipV="0">
+            <a:off x="8626822" y="3854013"/>
+            <a:ext cx="2545290" cy="2800126"/>
+          </a:xfrm>
+          <a:prstGeom prst="rect">
+            <a:avLst/>
+          </a:prstGeom>
+        </p:spPr>
+      </p:pic>
     </p:spTree>
   </p:cSld>
   <p:clrMapOvr>
@@ -9164,7 +9186,7 @@
       </p:grpSpPr>
       <p:sp>
         <p:nvSpPr>
-          <p:cNvPr id="1924950336" name="Title 1"/>
+          <p:cNvPr id="1043174723" name="Title 1"/>
           <p:cNvSpPr>
             <a:spLocks noGrp="1"/>
           </p:cNvSpPr>
@@ -9202,7 +9224,7 @@
       </p:sp>
       <p:sp>
         <p:nvSpPr>
-          <p:cNvPr id="878904209" name="Content Placeholder 2"/>
+          <p:cNvPr id="1589701636" name="Content Placeholder 2"/>
           <p:cNvSpPr>
             <a:spLocks noGrp="1"/>
           </p:cNvSpPr>
@@ -9212,7 +9234,7 @@
         </p:nvSpPr>
         <p:spPr bwMode="auto">
           <a:xfrm flipH="0" flipV="0">
-            <a:off x="295034" y="765121"/>
+            <a:off x="194068" y="705324"/>
             <a:ext cx="11620618" cy="5982711"/>
           </a:xfrm>
         </p:spPr>
@@ -9653,7 +9675,7 @@
       </p:sp>
       <p:pic>
         <p:nvPicPr>
-          <p:cNvPr id="817170980" name="Picture 3"/>
+          <p:cNvPr id="141635630" name="Picture 3"/>
           <p:cNvPicPr>
             <a:picLocks noChangeAspect="1"/>
           </p:cNvPicPr>
@@ -9675,7 +9697,7 @@
       </p:pic>
       <p:sp>
         <p:nvSpPr>
-          <p:cNvPr id="377196002" name=""/>
+          <p:cNvPr id="791080215" name=""/>
           <p:cNvSpPr txBox="1"/>
           <p:nvPr/>
         </p:nvSpPr>
@@ -9697,6 +9719,176 @@
             <a:pPr algn="l">
               <a:defRPr/>
             </a:pPr>
+            <a:endParaRPr/>
+          </a:p>
+        </p:txBody>
+      </p:sp>
+      <p:sp>
+        <p:nvSpPr>
+          <p:cNvPr id="1470948146" name="TextBox 13"/>
+          <p:cNvSpPr txBox="1"/>
+          <p:nvPr/>
+        </p:nvSpPr>
+        <p:spPr bwMode="auto">
+          <a:xfrm flipH="0" flipV="0">
+            <a:off x="633387" y="6030643"/>
+            <a:ext cx="3213850" cy="396599"/>
+          </a:xfrm>
+          <a:prstGeom prst="rect">
+            <a:avLst/>
+          </a:prstGeom>
+          <a:noFill/>
+        </p:spPr>
+        <p:txBody>
+          <a:bodyPr wrap="square">
+            <a:spAutoFit/>
+          </a:bodyPr>
+          <a:lstStyle>
+            <a:defPPr>
+              <a:defRPr lang="en-US"/>
+            </a:defPPr>
+            <a:lvl1pPr marL="0" algn="l" defTabSz="914400">
+              <a:defRPr sz="1800">
+                <a:solidFill>
+                  <a:schemeClr val="tx1"/>
+                </a:solidFill>
+                <a:latin typeface="+mn-lt"/>
+                <a:ea typeface="+mn-ea"/>
+                <a:cs typeface="+mn-cs"/>
+              </a:defRPr>
+            </a:lvl1pPr>
+            <a:lvl2pPr marL="457200" algn="l" defTabSz="914400">
+              <a:defRPr sz="1800">
+                <a:solidFill>
+                  <a:schemeClr val="tx1"/>
+                </a:solidFill>
+                <a:latin typeface="+mn-lt"/>
+                <a:ea typeface="+mn-ea"/>
+                <a:cs typeface="+mn-cs"/>
+              </a:defRPr>
+            </a:lvl2pPr>
+            <a:lvl3pPr marL="914400" algn="l" defTabSz="914400">
+              <a:defRPr sz="1800">
+                <a:solidFill>
+                  <a:schemeClr val="tx1"/>
+                </a:solidFill>
+                <a:latin typeface="+mn-lt"/>
+                <a:ea typeface="+mn-ea"/>
+                <a:cs typeface="+mn-cs"/>
+              </a:defRPr>
+            </a:lvl3pPr>
+            <a:lvl4pPr marL="1371600" algn="l" defTabSz="914400">
+              <a:defRPr sz="1800">
+                <a:solidFill>
+                  <a:schemeClr val="tx1"/>
+                </a:solidFill>
+                <a:latin typeface="+mn-lt"/>
+                <a:ea typeface="+mn-ea"/>
+                <a:cs typeface="+mn-cs"/>
+              </a:defRPr>
+            </a:lvl4pPr>
+            <a:lvl5pPr marL="1828800" algn="l" defTabSz="914400">
+              <a:defRPr sz="1800">
+                <a:solidFill>
+                  <a:schemeClr val="tx1"/>
+                </a:solidFill>
+                <a:latin typeface="+mn-lt"/>
+                <a:ea typeface="+mn-ea"/>
+                <a:cs typeface="+mn-cs"/>
+              </a:defRPr>
+            </a:lvl5pPr>
+            <a:lvl6pPr marL="2286000" algn="l" defTabSz="914400">
+              <a:defRPr sz="1800">
+                <a:solidFill>
+                  <a:schemeClr val="tx1"/>
+                </a:solidFill>
+                <a:latin typeface="+mn-lt"/>
+                <a:ea typeface="+mn-ea"/>
+                <a:cs typeface="+mn-cs"/>
+              </a:defRPr>
+            </a:lvl6pPr>
+            <a:lvl7pPr marL="2743200" algn="l" defTabSz="914400">
+              <a:defRPr sz="1800">
+                <a:solidFill>
+                  <a:schemeClr val="tx1"/>
+                </a:solidFill>
+                <a:latin typeface="+mn-lt"/>
+                <a:ea typeface="+mn-ea"/>
+                <a:cs typeface="+mn-cs"/>
+              </a:defRPr>
+            </a:lvl7pPr>
+            <a:lvl8pPr marL="3200400" algn="l" defTabSz="914400">
+              <a:defRPr sz="1800">
+                <a:solidFill>
+                  <a:schemeClr val="tx1"/>
+                </a:solidFill>
+                <a:latin typeface="+mn-lt"/>
+                <a:ea typeface="+mn-ea"/>
+                <a:cs typeface="+mn-cs"/>
+              </a:defRPr>
+            </a:lvl8pPr>
+            <a:lvl9pPr marL="3657600" algn="l" defTabSz="914400">
+              <a:defRPr sz="1800">
+                <a:solidFill>
+                  <a:schemeClr val="tx1"/>
+                </a:solidFill>
+                <a:latin typeface="+mn-lt"/>
+                <a:ea typeface="+mn-ea"/>
+                <a:cs typeface="+mn-cs"/>
+              </a:defRPr>
+            </a:lvl9pPr>
+          </a:lstStyle>
+          <a:p>
+            <a:pPr>
+              <a:defRPr/>
+            </a:pPr>
+            <a:r>
+              <a:rPr sz="2000" b="0" i="0" u="none">
+                <a:solidFill>
+                  <a:schemeClr val="bg1"/>
+                </a:solidFill>
+                <a:latin typeface="Times New Roman"/>
+                <a:ea typeface="Times New Roman"/>
+                <a:cs typeface="Times New Roman"/>
+              </a:rPr>
+              <a:t>Lesson Code – GitHub URL:</a:t>
+            </a:r>
+            <a:endParaRPr/>
+          </a:p>
+        </p:txBody>
+      </p:sp>
+      <p:sp>
+        <p:nvSpPr>
+          <p:cNvPr id="751675342" name=""/>
+          <p:cNvSpPr txBox="1"/>
+          <p:nvPr/>
+        </p:nvSpPr>
+        <p:spPr bwMode="auto">
+          <a:xfrm flipH="0" flipV="0">
+            <a:off x="4147002" y="5864907"/>
+            <a:ext cx="5892373" cy="914760"/>
+          </a:xfrm>
+          <a:prstGeom prst="rect">
+            <a:avLst/>
+          </a:prstGeom>
+          <a:noFill/>
+        </p:spPr>
+        <p:txBody>
+          <a:bodyPr vertOverflow="overflow" horzOverflow="overflow" vert="horz" wrap="square" lIns="91440" tIns="45720" rIns="91440" bIns="45720" numCol="1" spcCol="0" rtlCol="0" fromWordArt="0" anchor="t" anchorCtr="0" forceAA="0" upright="0" compatLnSpc="0">
+            <a:spAutoFit/>
+          </a:bodyPr>
+          <a:p>
+            <a:pPr algn="l">
+              <a:defRPr/>
+            </a:pPr>
+            <a:r>
+              <a:rPr>
+                <a:solidFill>
+                  <a:schemeClr val="bg1"/>
+                </a:solidFill>
+              </a:rPr>
+              <a:t>https://github.com/info-zas/zas-robotics-car-3-encoders-imu-gps/tree/main/01_FoundationProjects/01_Car-3_Basic_Movements</a:t>
+            </a:r>
             <a:endParaRPr/>
           </a:p>
         </p:txBody>
@@ -9743,7 +9935,7 @@
       </p:grpSpPr>
       <p:sp>
         <p:nvSpPr>
-          <p:cNvPr id="1898536405" name="Title 1"/>
+          <p:cNvPr id="2127917394" name="Title 1"/>
           <p:cNvSpPr>
             <a:spLocks noGrp="1"/>
           </p:cNvSpPr>
@@ -9778,7 +9970,7 @@
       </p:sp>
       <p:sp>
         <p:nvSpPr>
-          <p:cNvPr id="1616042511" name="Content Placeholder 2"/>
+          <p:cNvPr id="554785684" name="Content Placeholder 2"/>
           <p:cNvSpPr>
             <a:spLocks noGrp="1"/>
           </p:cNvSpPr>
@@ -9860,7 +10052,7 @@
       </p:sp>
       <p:pic>
         <p:nvPicPr>
-          <p:cNvPr id="844913418" name="Picture 3"/>
+          <p:cNvPr id="1752636349" name="Picture 3"/>
           <p:cNvPicPr>
             <a:picLocks noChangeAspect="1"/>
           </p:cNvPicPr>
@@ -9922,7 +10114,7 @@
       </p:grpSpPr>
       <p:sp>
         <p:nvSpPr>
-          <p:cNvPr id="888140666" name="Title 1"/>
+          <p:cNvPr id="236631738" name="Title 1"/>
           <p:cNvSpPr>
             <a:spLocks noGrp="1"/>
           </p:cNvSpPr>
@@ -9957,7 +10149,7 @@
       </p:sp>
       <p:sp>
         <p:nvSpPr>
-          <p:cNvPr id="749396240" name="Content Placeholder 2"/>
+          <p:cNvPr id="337942771" name="Content Placeholder 2"/>
           <p:cNvSpPr>
             <a:spLocks noGrp="1"/>
           </p:cNvSpPr>
@@ -10406,7 +10598,7 @@
       </p:sp>
       <p:pic>
         <p:nvPicPr>
-          <p:cNvPr id="879739424" name="Picture 3"/>
+          <p:cNvPr id="662290956" name="Picture 3"/>
           <p:cNvPicPr>
             <a:picLocks noChangeAspect="1"/>
           </p:cNvPicPr>
@@ -10468,7 +10660,7 @@
       </p:grpSpPr>
       <p:sp>
         <p:nvSpPr>
-          <p:cNvPr id="471499680" name="Title 1"/>
+          <p:cNvPr id="1477290101" name="Title 1"/>
           <p:cNvSpPr>
             <a:spLocks noGrp="1"/>
           </p:cNvSpPr>
@@ -10503,7 +10695,7 @@
       </p:sp>
       <p:sp>
         <p:nvSpPr>
-          <p:cNvPr id="553238374" name="Content Placeholder 2"/>
+          <p:cNvPr id="1268677733" name="Content Placeholder 2"/>
           <p:cNvSpPr>
             <a:spLocks noGrp="1"/>
           </p:cNvSpPr>
@@ -10864,7 +11056,7 @@
       </p:sp>
       <p:pic>
         <p:nvPicPr>
-          <p:cNvPr id="498433870" name="Picture 3"/>
+          <p:cNvPr id="845439487" name="Picture 3"/>
           <p:cNvPicPr>
             <a:picLocks noChangeAspect="1"/>
           </p:cNvPicPr>
@@ -10926,7 +11118,7 @@
       </p:grpSpPr>
       <p:sp>
         <p:nvSpPr>
-          <p:cNvPr id="545892328" name="Title 1"/>
+          <p:cNvPr id="2109855796" name="Title 1"/>
           <p:cNvSpPr>
             <a:spLocks noGrp="1"/>
           </p:cNvSpPr>
@@ -10964,7 +11156,7 @@
       </p:sp>
       <p:sp>
         <p:nvSpPr>
-          <p:cNvPr id="1020008982" name="Content Placeholder 2"/>
+          <p:cNvPr id="333552143" name="Content Placeholder 2"/>
           <p:cNvSpPr>
             <a:spLocks noGrp="1"/>
           </p:cNvSpPr>
@@ -11011,7 +11203,7 @@
       </p:sp>
       <p:pic>
         <p:nvPicPr>
-          <p:cNvPr id="958139909" name="Picture 3"/>
+          <p:cNvPr id="298234002" name="Picture 3"/>
           <p:cNvPicPr>
             <a:picLocks noChangeAspect="1"/>
           </p:cNvPicPr>
@@ -11033,7 +11225,7 @@
       </p:pic>
       <p:pic>
         <p:nvPicPr>
-          <p:cNvPr id="1381888214" name=""/>
+          <p:cNvPr id="1674166548" name=""/>
           <p:cNvPicPr>
             <a:picLocks noChangeAspect="1"/>
           </p:cNvPicPr>
@@ -11055,7 +11247,7 @@
       </p:pic>
       <p:sp>
         <p:nvSpPr>
-          <p:cNvPr id="544991100" name=""/>
+          <p:cNvPr id="1596688702" name=""/>
           <p:cNvSpPr/>
           <p:nvPr/>
         </p:nvSpPr>
@@ -11090,7 +11282,7 @@
       </p:sp>
       <p:pic>
         <p:nvPicPr>
-          <p:cNvPr id="542864191" name=""/>
+          <p:cNvPr id="1316060187" name=""/>
           <p:cNvPicPr>
             <a:picLocks noChangeAspect="1"/>
           </p:cNvPicPr>
@@ -11152,7 +11344,7 @@
       </p:grpSpPr>
       <p:sp>
         <p:nvSpPr>
-          <p:cNvPr id="1280355278" name="Title 1"/>
+          <p:cNvPr id="847745062" name="Title 1"/>
           <p:cNvSpPr>
             <a:spLocks noGrp="1"/>
           </p:cNvSpPr>
@@ -11190,7 +11382,7 @@
       </p:sp>
       <p:sp>
         <p:nvSpPr>
-          <p:cNvPr id="353949692" name="Content Placeholder 2"/>
+          <p:cNvPr id="1397864260" name="Content Placeholder 2"/>
           <p:cNvSpPr>
             <a:spLocks noGrp="1"/>
           </p:cNvSpPr>
@@ -11250,7 +11442,7 @@
       </p:sp>
       <p:pic>
         <p:nvPicPr>
-          <p:cNvPr id="508060349" name="Picture 3"/>
+          <p:cNvPr id="875141591" name="Picture 3"/>
           <p:cNvPicPr>
             <a:picLocks noChangeAspect="1"/>
           </p:cNvPicPr>
@@ -11272,7 +11464,7 @@
       </p:pic>
       <p:graphicFrame>
         <p:nvGraphicFramePr>
-          <p:cNvPr id="225891540" name=""/>
+          <p:cNvPr id="399580105" name=""/>
           <p:cNvGraphicFramePr>
             <a:graphicFrameLocks xmlns:a="http://schemas.openxmlformats.org/drawingml/2006/main"/>
           </p:cNvGraphicFramePr>
@@ -12820,7 +13012,7 @@
       </p:grpSpPr>
       <p:sp>
         <p:nvSpPr>
-          <p:cNvPr id="1991922416" name="Title 1"/>
+          <p:cNvPr id="86144128" name="Title 1"/>
           <p:cNvSpPr>
             <a:spLocks noGrp="1"/>
           </p:cNvSpPr>
@@ -12858,7 +13050,7 @@
       </p:sp>
       <p:sp>
         <p:nvSpPr>
-          <p:cNvPr id="1022634409" name="Content Placeholder 2"/>
+          <p:cNvPr id="1951931705" name="Content Placeholder 2"/>
           <p:cNvSpPr>
             <a:spLocks noGrp="1"/>
           </p:cNvSpPr>
@@ -12920,7 +13112,7 @@
       </p:sp>
       <p:pic>
         <p:nvPicPr>
-          <p:cNvPr id="2090325077" name="Picture 3"/>
+          <p:cNvPr id="1904073638" name="Picture 3"/>
           <p:cNvPicPr>
             <a:picLocks noChangeAspect="1"/>
           </p:cNvPicPr>
@@ -12942,7 +13134,7 @@
       </p:pic>
       <p:graphicFrame>
         <p:nvGraphicFramePr>
-          <p:cNvPr id="745865683" name=""/>
+          <p:cNvPr id="1750148481" name=""/>
           <p:cNvGraphicFramePr>
             <a:graphicFrameLocks xmlns:a="http://schemas.openxmlformats.org/drawingml/2006/main"/>
           </p:cNvGraphicFramePr>
@@ -14182,7 +14374,7 @@
       </p:graphicFrame>
       <p:graphicFrame>
         <p:nvGraphicFramePr>
-          <p:cNvPr id="1768350028" name=""/>
+          <p:cNvPr id="1329840087" name=""/>
           <p:cNvGraphicFramePr>
             <a:graphicFrameLocks xmlns:a="http://schemas.openxmlformats.org/drawingml/2006/main"/>
           </p:cNvGraphicFramePr>
@@ -14744,7 +14936,7 @@
       </p:graphicFrame>
       <p:sp>
         <p:nvSpPr>
-          <p:cNvPr id="1757188528" name=""/>
+          <p:cNvPr id="196571803" name=""/>
           <p:cNvSpPr/>
           <p:nvPr/>
         </p:nvSpPr>
@@ -14780,7 +14972,7 @@
       </p:sp>
       <p:pic>
         <p:nvPicPr>
-          <p:cNvPr id="1424133035" name=""/>
+          <p:cNvPr id="574845127" name=""/>
           <p:cNvPicPr>
             <a:picLocks noChangeAspect="1"/>
           </p:cNvPicPr>
@@ -14842,7 +15034,7 @@
       </p:grpSpPr>
       <p:sp>
         <p:nvSpPr>
-          <p:cNvPr id="709612885" name="Title 1"/>
+          <p:cNvPr id="250862029" name="Title 1"/>
           <p:cNvSpPr>
             <a:spLocks noGrp="1"/>
           </p:cNvSpPr>
@@ -14880,7 +15072,7 @@
       </p:sp>
       <p:sp>
         <p:nvSpPr>
-          <p:cNvPr id="341486821" name="Content Placeholder 2"/>
+          <p:cNvPr id="1772330129" name="Content Placeholder 2"/>
           <p:cNvSpPr>
             <a:spLocks noGrp="1"/>
           </p:cNvSpPr>
@@ -14922,7 +15114,7 @@
       </p:sp>
       <p:pic>
         <p:nvPicPr>
-          <p:cNvPr id="1937670205" name="Picture 3"/>
+          <p:cNvPr id="1589958022" name="Picture 3"/>
           <p:cNvPicPr>
             <a:picLocks noChangeAspect="1"/>
           </p:cNvPicPr>
@@ -14944,7 +15136,7 @@
       </p:pic>
       <p:graphicFrame>
         <p:nvGraphicFramePr>
-          <p:cNvPr id="642810608" name=""/>
+          <p:cNvPr id="1769550226" name=""/>
           <p:cNvGraphicFramePr>
             <a:graphicFrameLocks xmlns:a="http://schemas.openxmlformats.org/drawingml/2006/main"/>
           </p:cNvGraphicFramePr>
@@ -16716,7 +16908,7 @@
       </p:grpSpPr>
       <p:sp>
         <p:nvSpPr>
-          <p:cNvPr id="1833574111" name="Title 1"/>
+          <p:cNvPr id="896412119" name="Title 1"/>
           <p:cNvSpPr>
             <a:spLocks noGrp="1"/>
           </p:cNvSpPr>
@@ -16754,7 +16946,7 @@
       </p:sp>
       <p:sp>
         <p:nvSpPr>
-          <p:cNvPr id="1648383105" name="Content Placeholder 2"/>
+          <p:cNvPr id="1231157854" name="Content Placeholder 2"/>
           <p:cNvSpPr>
             <a:spLocks noGrp="1"/>
           </p:cNvSpPr>
@@ -16811,7 +17003,7 @@
       </p:sp>
       <p:pic>
         <p:nvPicPr>
-          <p:cNvPr id="701449389" name="Picture 3"/>
+          <p:cNvPr id="1341311252" name="Picture 3"/>
           <p:cNvPicPr>
             <a:picLocks noChangeAspect="1"/>
           </p:cNvPicPr>
@@ -16833,7 +17025,7 @@
       </p:pic>
       <p:graphicFrame>
         <p:nvGraphicFramePr>
-          <p:cNvPr id="1080315722" name=""/>
+          <p:cNvPr id="1182336921" name=""/>
           <p:cNvGraphicFramePr>
             <a:graphicFrameLocks xmlns:a="http://schemas.openxmlformats.org/drawingml/2006/main"/>
           </p:cNvGraphicFramePr>
@@ -19031,7 +19223,7 @@
       </p:grpSpPr>
       <p:sp>
         <p:nvSpPr>
-          <p:cNvPr id="1802413533" name="Title 1"/>
+          <p:cNvPr id="530276496" name="Title 1"/>
           <p:cNvSpPr>
             <a:spLocks noGrp="1"/>
           </p:cNvSpPr>
@@ -19069,7 +19261,7 @@
       </p:sp>
       <p:sp>
         <p:nvSpPr>
-          <p:cNvPr id="1690204237" name="Content Placeholder 2"/>
+          <p:cNvPr id="1661807249" name="Content Placeholder 2"/>
           <p:cNvSpPr>
             <a:spLocks noGrp="1"/>
           </p:cNvSpPr>
@@ -19116,7 +19308,7 @@
       </p:sp>
       <p:pic>
         <p:nvPicPr>
-          <p:cNvPr id="868168624" name="Picture 3"/>
+          <p:cNvPr id="1647327744" name="Picture 3"/>
           <p:cNvPicPr>
             <a:picLocks noChangeAspect="1"/>
           </p:cNvPicPr>
@@ -19138,7 +19330,7 @@
       </p:pic>
       <p:graphicFrame>
         <p:nvGraphicFramePr>
-          <p:cNvPr id="2051597664" name=""/>
+          <p:cNvPr id="638534600" name=""/>
           <p:cNvGraphicFramePr>
             <a:graphicFrameLocks xmlns:a="http://schemas.openxmlformats.org/drawingml/2006/main"/>
           </p:cNvGraphicFramePr>
@@ -21133,7 +21325,7 @@
       </p:graphicFrame>
       <p:pic>
         <p:nvPicPr>
-          <p:cNvPr id="2011282988" name=""/>
+          <p:cNvPr id="978185775" name=""/>
           <p:cNvPicPr>
             <a:picLocks noChangeAspect="1"/>
           </p:cNvPicPr>
@@ -21219,8 +21411,8 @@
         </p:nvSpPr>
         <p:spPr bwMode="auto">
           <a:xfrm flipH="0" flipV="0">
-            <a:off x="427875" y="1463466"/>
-            <a:ext cx="4177462" cy="1371960"/>
+            <a:off x="250163" y="1463466"/>
+            <a:ext cx="4356253" cy="1371960"/>
           </a:xfrm>
         </p:spPr>
         <p:txBody>
@@ -21235,7 +21427,7 @@
             <a:r>
               <a:rPr sz="1400" b="1" i="0" u="none">
                 <a:solidFill>
-                  <a:schemeClr val="bg1"/>
+                  <a:srgbClr val="FFC000"/>
                 </a:solidFill>
                 <a:latin typeface="Aptos Display"/>
                 <a:ea typeface="Aptos Display"/>

</xml_diff>